<commit_message>
actualizacion de fuente de botones
</commit_message>
<xml_diff>
--- a/group6/Proyecto.pptx
+++ b/group6/Proyecto.pptx
@@ -5,15 +5,17 @@
     <p:sldMasterId id="2147483660" r:id="rId4"/>
   </p:sldMasterIdLst>
   <p:notesMasterIdLst>
-    <p:notesMasterId r:id="rId8"/>
+    <p:notesMasterId r:id="rId10"/>
   </p:notesMasterIdLst>
   <p:handoutMasterIdLst>
-    <p:handoutMasterId r:id="rId9"/>
+    <p:handoutMasterId r:id="rId11"/>
   </p:handoutMasterIdLst>
   <p:sldIdLst>
     <p:sldId id="256" r:id="rId5"/>
     <p:sldId id="265" r:id="rId6"/>
     <p:sldId id="266" r:id="rId7"/>
+    <p:sldId id="267" r:id="rId8"/>
+    <p:sldId id="268" r:id="rId9"/>
   </p:sldIdLst>
   <p:sldSz cx="12192000" cy="6858000"/>
   <p:notesSz cx="6858000" cy="9144000"/>
@@ -120,6 +122,8 @@
             <p14:sldId id="256"/>
             <p14:sldId id="265"/>
             <p14:sldId id="266"/>
+            <p14:sldId id="267"/>
+            <p14:sldId id="268"/>
           </p14:sldIdLst>
         </p14:section>
         <p14:section name="Diseñar, impresionar y trabajar de manera conjunta" id="{B9B51309-D148-4332-87C2-07BE32FBCA3B}">
@@ -1194,7 +1198,7 @@
           <p:cNvPr id="2" name="Marcador de encabezado 1">
             <a:extLst>
               <a:ext uri="{FF2B5EF4-FFF2-40B4-BE49-F238E27FC236}">
-                <a16:creationId xmlns:a16="http://schemas.microsoft.com/office/drawing/2014/main" xmlns="" id="{15F8A9B1-1372-4D6E-BDB5-6E27FD94B4D7}"/>
+                <a16:creationId xmlns="" xmlns:a16="http://schemas.microsoft.com/office/drawing/2014/main" id="{15F8A9B1-1372-4D6E-BDB5-6E27FD94B4D7}"/>
               </a:ext>
             </a:extLst>
           </p:cNvPr>
@@ -1231,7 +1235,7 @@
           <p:cNvPr id="3" name="Marcador de fecha 2">
             <a:extLst>
               <a:ext uri="{FF2B5EF4-FFF2-40B4-BE49-F238E27FC236}">
-                <a16:creationId xmlns:a16="http://schemas.microsoft.com/office/drawing/2014/main" xmlns="" id="{D48937DA-465D-4391-AF36-F9521626C8A3}"/>
+                <a16:creationId xmlns="" xmlns:a16="http://schemas.microsoft.com/office/drawing/2014/main" id="{D48937DA-465D-4391-AF36-F9521626C8A3}"/>
               </a:ext>
             </a:extLst>
           </p:cNvPr>
@@ -1272,7 +1276,7 @@
           <p:cNvPr id="4" name="Marcador de pie de página 3">
             <a:extLst>
               <a:ext uri="{FF2B5EF4-FFF2-40B4-BE49-F238E27FC236}">
-                <a16:creationId xmlns:a16="http://schemas.microsoft.com/office/drawing/2014/main" xmlns="" id="{F5350386-CB2E-4296-9A33-272CACAEDFC0}"/>
+                <a16:creationId xmlns="" xmlns:a16="http://schemas.microsoft.com/office/drawing/2014/main" id="{F5350386-CB2E-4296-9A33-272CACAEDFC0}"/>
               </a:ext>
             </a:extLst>
           </p:cNvPr>
@@ -1309,7 +1313,7 @@
           <p:cNvPr id="5" name="Marcador de número de diapositiva 4">
             <a:extLst>
               <a:ext uri="{FF2B5EF4-FFF2-40B4-BE49-F238E27FC236}">
-                <a16:creationId xmlns:a16="http://schemas.microsoft.com/office/drawing/2014/main" xmlns="" id="{1AC94D2B-9DEC-4036-8D64-0D156A1A3FE0}"/>
+                <a16:creationId xmlns="" xmlns:a16="http://schemas.microsoft.com/office/drawing/2014/main" id="{1AC94D2B-9DEC-4036-8D64-0D156A1A3FE0}"/>
               </a:ext>
             </a:extLst>
           </p:cNvPr>
@@ -6295,6 +6299,13 @@
   <p:clrMapOvr>
     <a:masterClrMapping/>
   </p:clrMapOvr>
+  <p:timing>
+    <p:tnLst>
+      <p:par>
+        <p:cTn id="1" dur="indefinite" restart="never" nodeType="tmRoot"/>
+      </p:par>
+    </p:tnLst>
+  </p:timing>
 </p:sld>
 </file>
 
@@ -6466,6 +6477,130 @@
   <p:clrMapOvr>
     <a:masterClrMapping/>
   </p:clrMapOvr>
+</p:sld>
+</file>
+
+<file path=ppt/slides/slide4.xml><?xml version="1.0" encoding="utf-8"?>
+<p:sld xmlns:a="http://schemas.openxmlformats.org/drawingml/2006/main" xmlns:r="http://schemas.openxmlformats.org/officeDocument/2006/relationships" xmlns:p="http://schemas.openxmlformats.org/presentationml/2006/main">
+  <p:cSld>
+    <p:spTree>
+      <p:nvGrpSpPr>
+        <p:cNvPr id="1" name=""/>
+        <p:cNvGrpSpPr/>
+        <p:nvPr/>
+      </p:nvGrpSpPr>
+      <p:grpSpPr>
+        <a:xfrm>
+          <a:off x="0" y="0"/>
+          <a:ext cx="0" cy="0"/>
+          <a:chOff x="0" y="0"/>
+          <a:chExt cx="0" cy="0"/>
+        </a:xfrm>
+      </p:grpSpPr>
+      <p:sp>
+        <p:nvSpPr>
+          <p:cNvPr id="2" name="Título 1"/>
+          <p:cNvSpPr>
+            <a:spLocks noGrp="1"/>
+          </p:cNvSpPr>
+          <p:nvPr>
+            <p:ph type="title"/>
+          </p:nvPr>
+        </p:nvSpPr>
+        <p:spPr/>
+        <p:txBody>
+          <a:bodyPr/>
+          <a:lstStyle/>
+          <a:p>
+            <a:endParaRPr lang="es-ES"/>
+          </a:p>
+        </p:txBody>
+      </p:sp>
+    </p:spTree>
+    <p:extLst>
+      <p:ext uri="{BB962C8B-B14F-4D97-AF65-F5344CB8AC3E}">
+        <p14:creationId xmlns:p14="http://schemas.microsoft.com/office/powerpoint/2010/main" val="2736573642"/>
+      </p:ext>
+    </p:extLst>
+  </p:cSld>
+  <p:clrMapOvr>
+    <a:masterClrMapping/>
+  </p:clrMapOvr>
+</p:sld>
+</file>
+
+<file path=ppt/slides/slide5.xml><?xml version="1.0" encoding="utf-8"?>
+<p:sld xmlns:a="http://schemas.openxmlformats.org/drawingml/2006/main" xmlns:r="http://schemas.openxmlformats.org/officeDocument/2006/relationships" xmlns:p="http://schemas.openxmlformats.org/presentationml/2006/main">
+  <p:cSld>
+    <p:spTree>
+      <p:nvGrpSpPr>
+        <p:cNvPr id="1" name=""/>
+        <p:cNvGrpSpPr/>
+        <p:nvPr/>
+      </p:nvGrpSpPr>
+      <p:grpSpPr>
+        <a:xfrm>
+          <a:off x="0" y="0"/>
+          <a:ext cx="0" cy="0"/>
+          <a:chOff x="0" y="0"/>
+          <a:chExt cx="0" cy="0"/>
+        </a:xfrm>
+      </p:grpSpPr>
+      <p:sp>
+        <p:nvSpPr>
+          <p:cNvPr id="2" name="Título 1"/>
+          <p:cNvSpPr>
+            <a:spLocks noGrp="1"/>
+          </p:cNvSpPr>
+          <p:nvPr>
+            <p:ph type="title"/>
+          </p:nvPr>
+        </p:nvSpPr>
+        <p:spPr/>
+        <p:txBody>
+          <a:bodyPr/>
+          <a:lstStyle/>
+          <a:p>
+            <a:endParaRPr lang="es-ES"/>
+          </a:p>
+        </p:txBody>
+      </p:sp>
+      <p:sp>
+        <p:nvSpPr>
+          <p:cNvPr id="3" name="Marcador de contenido 2"/>
+          <p:cNvSpPr>
+            <a:spLocks noGrp="1"/>
+          </p:cNvSpPr>
+          <p:nvPr>
+            <p:ph idx="1"/>
+          </p:nvPr>
+        </p:nvSpPr>
+        <p:spPr/>
+        <p:txBody>
+          <a:bodyPr/>
+          <a:lstStyle/>
+          <a:p>
+            <a:endParaRPr lang="es-ES"/>
+          </a:p>
+        </p:txBody>
+      </p:sp>
+    </p:spTree>
+    <p:extLst>
+      <p:ext uri="{BB962C8B-B14F-4D97-AF65-F5344CB8AC3E}">
+        <p14:creationId xmlns:p14="http://schemas.microsoft.com/office/powerpoint/2010/main" val="1739042776"/>
+      </p:ext>
+    </p:extLst>
+  </p:cSld>
+  <p:clrMapOvr>
+    <a:masterClrMapping/>
+  </p:clrMapOvr>
+  <p:timing>
+    <p:tnLst>
+      <p:par>
+        <p:cTn id="1" dur="indefinite" restart="never" nodeType="tmRoot"/>
+      </p:par>
+    </p:tnLst>
+  </p:timing>
 </p:sld>
 </file>
 
@@ -7227,129 +7362,12 @@
 </file>
 
 <file path=customXml/item1.xml><?xml version="1.0" encoding="utf-8"?>
-<p:properties xmlns:p="http://schemas.microsoft.com/office/2006/metadata/properties" xmlns:xsi="http://www.w3.org/2001/XMLSchema-instance" xmlns:pc="http://schemas.microsoft.com/office/infopath/2007/PartnerControls">
-  <documentManagement>
-    <DirectSourceMarket xmlns="4873beb7-5857-4685-be1f-d57550cc96cc" xsi:nil="true"/>
-    <ApprovalStatus xmlns="4873beb7-5857-4685-be1f-d57550cc96cc">InProgress</ApprovalStatus>
-    <MarketSpecific xmlns="4873beb7-5857-4685-be1f-d57550cc96cc">false</MarketSpecific>
-    <LocComments xmlns="4873beb7-5857-4685-be1f-d57550cc96cc" xsi:nil="true"/>
-    <ThumbnailAssetId xmlns="4873beb7-5857-4685-be1f-d57550cc96cc" xsi:nil="true"/>
-    <PrimaryImageGen xmlns="4873beb7-5857-4685-be1f-d57550cc96cc">true</PrimaryImageGen>
-    <LegacyData xmlns="4873beb7-5857-4685-be1f-d57550cc96cc" xsi:nil="true"/>
-    <LocRecommendedHandoff xmlns="4873beb7-5857-4685-be1f-d57550cc96cc" xsi:nil="true"/>
-    <BusinessGroup xmlns="4873beb7-5857-4685-be1f-d57550cc96cc" xsi:nil="true"/>
-    <BlockPublish xmlns="4873beb7-5857-4685-be1f-d57550cc96cc">false</BlockPublish>
-    <TPFriendlyName xmlns="4873beb7-5857-4685-be1f-d57550cc96cc" xsi:nil="true"/>
-    <NumericId xmlns="4873beb7-5857-4685-be1f-d57550cc96cc" xsi:nil="true"/>
-    <APEditor xmlns="4873beb7-5857-4685-be1f-d57550cc96cc">
-      <UserInfo>
-        <DisplayName/>
-        <AccountId xsi:nil="true"/>
-        <AccountType/>
-      </UserInfo>
-    </APEditor>
-    <SourceTitle xmlns="4873beb7-5857-4685-be1f-d57550cc96cc" xsi:nil="true"/>
-    <OpenTemplate xmlns="4873beb7-5857-4685-be1f-d57550cc96cc">true</OpenTemplate>
-    <UALocComments xmlns="4873beb7-5857-4685-be1f-d57550cc96cc" xsi:nil="true"/>
-    <ParentAssetId xmlns="4873beb7-5857-4685-be1f-d57550cc96cc" xsi:nil="true"/>
-    <IntlLangReviewDate xmlns="4873beb7-5857-4685-be1f-d57550cc96cc" xsi:nil="true"/>
-    <FeatureTagsTaxHTField0 xmlns="4873beb7-5857-4685-be1f-d57550cc96cc">
-      <Terms xmlns="http://schemas.microsoft.com/office/infopath/2007/PartnerControls"/>
-    </FeatureTagsTaxHTField0>
-    <PublishStatusLookup xmlns="4873beb7-5857-4685-be1f-d57550cc96cc">
-      <Value>1584528</Value>
-    </PublishStatusLookup>
-    <Providers xmlns="4873beb7-5857-4685-be1f-d57550cc96cc" xsi:nil="true"/>
-    <MachineTranslated xmlns="4873beb7-5857-4685-be1f-d57550cc96cc">false</MachineTranslated>
-    <OriginalSourceMarket xmlns="4873beb7-5857-4685-be1f-d57550cc96cc" xsi:nil="true"/>
-    <APDescription xmlns="4873beb7-5857-4685-be1f-d57550cc96cc" xsi:nil="true"/>
-    <ClipArtFilename xmlns="4873beb7-5857-4685-be1f-d57550cc96cc" xsi:nil="true"/>
-    <ContentItem xmlns="4873beb7-5857-4685-be1f-d57550cc96cc" xsi:nil="true"/>
-    <TPInstallLocation xmlns="4873beb7-5857-4685-be1f-d57550cc96cc" xsi:nil="true"/>
-    <PublishTargets xmlns="4873beb7-5857-4685-be1f-d57550cc96cc">OfficeOnlineVNext</PublishTargets>
-    <TimesCloned xmlns="4873beb7-5857-4685-be1f-d57550cc96cc" xsi:nil="true"/>
-    <AssetStart xmlns="4873beb7-5857-4685-be1f-d57550cc96cc">2012-06-20T23:39:00+00:00</AssetStart>
-    <Provider xmlns="4873beb7-5857-4685-be1f-d57550cc96cc" xsi:nil="true"/>
-    <AcquiredFrom xmlns="4873beb7-5857-4685-be1f-d57550cc96cc">Internal MS</AcquiredFrom>
-    <FriendlyTitle xmlns="4873beb7-5857-4685-be1f-d57550cc96cc" xsi:nil="true"/>
-    <LastHandOff xmlns="4873beb7-5857-4685-be1f-d57550cc96cc" xsi:nil="true"/>
-    <TPClientViewer xmlns="4873beb7-5857-4685-be1f-d57550cc96cc" xsi:nil="true"/>
-    <UACurrentWords xmlns="4873beb7-5857-4685-be1f-d57550cc96cc" xsi:nil="true"/>
-    <ArtSampleDocs xmlns="4873beb7-5857-4685-be1f-d57550cc96cc" xsi:nil="true"/>
-    <UALocRecommendation xmlns="4873beb7-5857-4685-be1f-d57550cc96cc">Localize</UALocRecommendation>
-    <Manager xmlns="4873beb7-5857-4685-be1f-d57550cc96cc" xsi:nil="true"/>
-    <ShowIn xmlns="4873beb7-5857-4685-be1f-d57550cc96cc">Show everywhere</ShowIn>
-    <UANotes xmlns="4873beb7-5857-4685-be1f-d57550cc96cc" xsi:nil="true"/>
-    <TemplateStatus xmlns="4873beb7-5857-4685-be1f-d57550cc96cc">Complete</TemplateStatus>
-    <InternalTagsTaxHTField0 xmlns="4873beb7-5857-4685-be1f-d57550cc96cc">
-      <Terms xmlns="http://schemas.microsoft.com/office/infopath/2007/PartnerControls"/>
-    </InternalTagsTaxHTField0>
-    <CSXHash xmlns="4873beb7-5857-4685-be1f-d57550cc96cc" xsi:nil="true"/>
-    <Downloads xmlns="4873beb7-5857-4685-be1f-d57550cc96cc">0</Downloads>
-    <VoteCount xmlns="4873beb7-5857-4685-be1f-d57550cc96cc" xsi:nil="true"/>
-    <OOCacheId xmlns="4873beb7-5857-4685-be1f-d57550cc96cc" xsi:nil="true"/>
-    <IsDeleted xmlns="4873beb7-5857-4685-be1f-d57550cc96cc">false</IsDeleted>
-    <AssetExpire xmlns="4873beb7-5857-4685-be1f-d57550cc96cc">2029-01-01T08:00:00+00:00</AssetExpire>
-    <DSATActionTaken xmlns="4873beb7-5857-4685-be1f-d57550cc96cc" xsi:nil="true"/>
-    <CSXSubmissionMarket xmlns="4873beb7-5857-4685-be1f-d57550cc96cc" xsi:nil="true"/>
-    <TPExecutable xmlns="4873beb7-5857-4685-be1f-d57550cc96cc" xsi:nil="true"/>
-    <SubmitterId xmlns="4873beb7-5857-4685-be1f-d57550cc96cc" xsi:nil="true"/>
-    <EditorialTags xmlns="4873beb7-5857-4685-be1f-d57550cc96cc" xsi:nil="true"/>
-    <ApprovalLog xmlns="4873beb7-5857-4685-be1f-d57550cc96cc" xsi:nil="true"/>
-    <AssetType xmlns="4873beb7-5857-4685-be1f-d57550cc96cc">TP</AssetType>
-    <BugNumber xmlns="4873beb7-5857-4685-be1f-d57550cc96cc" xsi:nil="true"/>
-    <CSXSubmissionDate xmlns="4873beb7-5857-4685-be1f-d57550cc96cc" xsi:nil="true"/>
-    <CSXUpdate xmlns="4873beb7-5857-4685-be1f-d57550cc96cc">false</CSXUpdate>
-    <Milestone xmlns="4873beb7-5857-4685-be1f-d57550cc96cc" xsi:nil="true"/>
-    <RecommendationsModifier xmlns="4873beb7-5857-4685-be1f-d57550cc96cc" xsi:nil="true"/>
-    <OriginAsset xmlns="4873beb7-5857-4685-be1f-d57550cc96cc" xsi:nil="true"/>
-    <TPComponent xmlns="4873beb7-5857-4685-be1f-d57550cc96cc" xsi:nil="true"/>
-    <AssetId xmlns="4873beb7-5857-4685-be1f-d57550cc96cc">TP102923943</AssetId>
-    <IntlLocPriority xmlns="4873beb7-5857-4685-be1f-d57550cc96cc" xsi:nil="true"/>
-    <PolicheckWords xmlns="4873beb7-5857-4685-be1f-d57550cc96cc" xsi:nil="true"/>
-    <TPLaunchHelpLink xmlns="4873beb7-5857-4685-be1f-d57550cc96cc" xsi:nil="true"/>
-    <TPApplication xmlns="4873beb7-5857-4685-be1f-d57550cc96cc" xsi:nil="true"/>
-    <CrawlForDependencies xmlns="4873beb7-5857-4685-be1f-d57550cc96cc">false</CrawlForDependencies>
-    <HandoffToMSDN xmlns="4873beb7-5857-4685-be1f-d57550cc96cc" xsi:nil="true"/>
-    <PlannedPubDate xmlns="4873beb7-5857-4685-be1f-d57550cc96cc" xsi:nil="true"/>
-    <IntlLangReviewer xmlns="4873beb7-5857-4685-be1f-d57550cc96cc" xsi:nil="true"/>
-    <TrustLevel xmlns="4873beb7-5857-4685-be1f-d57550cc96cc">1 Microsoft Managed Content</TrustLevel>
-    <LocLastLocAttemptVersionLookup xmlns="4873beb7-5857-4685-be1f-d57550cc96cc">843282</LocLastLocAttemptVersionLookup>
-    <IsSearchable xmlns="4873beb7-5857-4685-be1f-d57550cc96cc">true</IsSearchable>
-    <TemplateTemplateType xmlns="4873beb7-5857-4685-be1f-d57550cc96cc">PowerPoint Template - Slideshow Launch</TemplateTemplateType>
-    <CampaignTagsTaxHTField0 xmlns="4873beb7-5857-4685-be1f-d57550cc96cc">
-      <Terms xmlns="http://schemas.microsoft.com/office/infopath/2007/PartnerControls"/>
-    </CampaignTagsTaxHTField0>
-    <TPNamespace xmlns="4873beb7-5857-4685-be1f-d57550cc96cc" xsi:nil="true"/>
-    <TaxCatchAll xmlns="4873beb7-5857-4685-be1f-d57550cc96cc"/>
-    <Markets xmlns="4873beb7-5857-4685-be1f-d57550cc96cc"/>
-    <UAProjectedTotalWords xmlns="4873beb7-5857-4685-be1f-d57550cc96cc" xsi:nil="true"/>
-    <IntlLangReview xmlns="4873beb7-5857-4685-be1f-d57550cc96cc">false</IntlLangReview>
-    <OutputCachingOn xmlns="4873beb7-5857-4685-be1f-d57550cc96cc">false</OutputCachingOn>
-    <AverageRating xmlns="4873beb7-5857-4685-be1f-d57550cc96cc" xsi:nil="true"/>
-    <LocMarketGroupTiers2 xmlns="4873beb7-5857-4685-be1f-d57550cc96cc" xsi:nil="true"/>
-    <APAuthor xmlns="4873beb7-5857-4685-be1f-d57550cc96cc">
-      <UserInfo>
-        <DisplayName>REDMOND\v-sa</DisplayName>
-        <AccountId>2467</AccountId>
-        <AccountType/>
-      </UserInfo>
-    </APAuthor>
-    <LocManualTestRequired xmlns="4873beb7-5857-4685-be1f-d57550cc96cc">false</LocManualTestRequired>
-    <TPCommandLine xmlns="4873beb7-5857-4685-be1f-d57550cc96cc" xsi:nil="true"/>
-    <TPAppVersion xmlns="4873beb7-5857-4685-be1f-d57550cc96cc" xsi:nil="true"/>
-    <EditorialStatus xmlns="4873beb7-5857-4685-be1f-d57550cc96cc">Complete</EditorialStatus>
-    <LastModifiedDateTime xmlns="4873beb7-5857-4685-be1f-d57550cc96cc" xsi:nil="true"/>
-    <ScenarioTagsTaxHTField0 xmlns="4873beb7-5857-4685-be1f-d57550cc96cc">
-      <Terms xmlns="http://schemas.microsoft.com/office/infopath/2007/PartnerControls"/>
-    </ScenarioTagsTaxHTField0>
-    <OriginalRelease xmlns="4873beb7-5857-4685-be1f-d57550cc96cc">15</OriginalRelease>
-    <TPLaunchHelpLinkType xmlns="4873beb7-5857-4685-be1f-d57550cc96cc">Template</TPLaunchHelpLinkType>
-    <LocalizationTagsTaxHTField0 xmlns="4873beb7-5857-4685-be1f-d57550cc96cc">
-      <Terms xmlns="http://schemas.microsoft.com/office/infopath/2007/PartnerControls"/>
-    </LocalizationTagsTaxHTField0>
-  </documentManagement>
-</p:properties>
+<?mso-contentType ?>
+<FormTemplates xmlns="http://schemas.microsoft.com/sharepoint/v3/contenttype/forms">
+  <Display>DocumentLibraryForm</Display>
+  <Edit>AssetEditForm</Edit>
+  <New>DocumentLibraryForm</New>
+</FormTemplates>
 </file>
 
 <file path=customXml/item2.xml><?xml version="1.0" encoding="utf-8"?>
@@ -8393,20 +8411,135 @@
 </file>
 
 <file path=customXml/item3.xml><?xml version="1.0" encoding="utf-8"?>
-<?mso-contentType ?>
-<FormTemplates xmlns="http://schemas.microsoft.com/sharepoint/v3/contenttype/forms">
-  <Display>DocumentLibraryForm</Display>
-  <Edit>AssetEditForm</Edit>
-  <New>DocumentLibraryForm</New>
-</FormTemplates>
+<p:properties xmlns:p="http://schemas.microsoft.com/office/2006/metadata/properties" xmlns:xsi="http://www.w3.org/2001/XMLSchema-instance" xmlns:pc="http://schemas.microsoft.com/office/infopath/2007/PartnerControls">
+  <documentManagement>
+    <DirectSourceMarket xmlns="4873beb7-5857-4685-be1f-d57550cc96cc" xsi:nil="true"/>
+    <ApprovalStatus xmlns="4873beb7-5857-4685-be1f-d57550cc96cc">InProgress</ApprovalStatus>
+    <MarketSpecific xmlns="4873beb7-5857-4685-be1f-d57550cc96cc">false</MarketSpecific>
+    <LocComments xmlns="4873beb7-5857-4685-be1f-d57550cc96cc" xsi:nil="true"/>
+    <ThumbnailAssetId xmlns="4873beb7-5857-4685-be1f-d57550cc96cc" xsi:nil="true"/>
+    <PrimaryImageGen xmlns="4873beb7-5857-4685-be1f-d57550cc96cc">true</PrimaryImageGen>
+    <LegacyData xmlns="4873beb7-5857-4685-be1f-d57550cc96cc" xsi:nil="true"/>
+    <LocRecommendedHandoff xmlns="4873beb7-5857-4685-be1f-d57550cc96cc" xsi:nil="true"/>
+    <BusinessGroup xmlns="4873beb7-5857-4685-be1f-d57550cc96cc" xsi:nil="true"/>
+    <BlockPublish xmlns="4873beb7-5857-4685-be1f-d57550cc96cc">false</BlockPublish>
+    <TPFriendlyName xmlns="4873beb7-5857-4685-be1f-d57550cc96cc" xsi:nil="true"/>
+    <NumericId xmlns="4873beb7-5857-4685-be1f-d57550cc96cc" xsi:nil="true"/>
+    <APEditor xmlns="4873beb7-5857-4685-be1f-d57550cc96cc">
+      <UserInfo>
+        <DisplayName/>
+        <AccountId xsi:nil="true"/>
+        <AccountType/>
+      </UserInfo>
+    </APEditor>
+    <SourceTitle xmlns="4873beb7-5857-4685-be1f-d57550cc96cc" xsi:nil="true"/>
+    <OpenTemplate xmlns="4873beb7-5857-4685-be1f-d57550cc96cc">true</OpenTemplate>
+    <UALocComments xmlns="4873beb7-5857-4685-be1f-d57550cc96cc" xsi:nil="true"/>
+    <ParentAssetId xmlns="4873beb7-5857-4685-be1f-d57550cc96cc" xsi:nil="true"/>
+    <IntlLangReviewDate xmlns="4873beb7-5857-4685-be1f-d57550cc96cc" xsi:nil="true"/>
+    <FeatureTagsTaxHTField0 xmlns="4873beb7-5857-4685-be1f-d57550cc96cc">
+      <Terms xmlns="http://schemas.microsoft.com/office/infopath/2007/PartnerControls"/>
+    </FeatureTagsTaxHTField0>
+    <PublishStatusLookup xmlns="4873beb7-5857-4685-be1f-d57550cc96cc">
+      <Value>1584528</Value>
+    </PublishStatusLookup>
+    <Providers xmlns="4873beb7-5857-4685-be1f-d57550cc96cc" xsi:nil="true"/>
+    <MachineTranslated xmlns="4873beb7-5857-4685-be1f-d57550cc96cc">false</MachineTranslated>
+    <OriginalSourceMarket xmlns="4873beb7-5857-4685-be1f-d57550cc96cc" xsi:nil="true"/>
+    <APDescription xmlns="4873beb7-5857-4685-be1f-d57550cc96cc" xsi:nil="true"/>
+    <ClipArtFilename xmlns="4873beb7-5857-4685-be1f-d57550cc96cc" xsi:nil="true"/>
+    <ContentItem xmlns="4873beb7-5857-4685-be1f-d57550cc96cc" xsi:nil="true"/>
+    <TPInstallLocation xmlns="4873beb7-5857-4685-be1f-d57550cc96cc" xsi:nil="true"/>
+    <PublishTargets xmlns="4873beb7-5857-4685-be1f-d57550cc96cc">OfficeOnlineVNext</PublishTargets>
+    <TimesCloned xmlns="4873beb7-5857-4685-be1f-d57550cc96cc" xsi:nil="true"/>
+    <AssetStart xmlns="4873beb7-5857-4685-be1f-d57550cc96cc">2012-06-20T23:39:00+00:00</AssetStart>
+    <Provider xmlns="4873beb7-5857-4685-be1f-d57550cc96cc" xsi:nil="true"/>
+    <AcquiredFrom xmlns="4873beb7-5857-4685-be1f-d57550cc96cc">Internal MS</AcquiredFrom>
+    <FriendlyTitle xmlns="4873beb7-5857-4685-be1f-d57550cc96cc" xsi:nil="true"/>
+    <LastHandOff xmlns="4873beb7-5857-4685-be1f-d57550cc96cc" xsi:nil="true"/>
+    <TPClientViewer xmlns="4873beb7-5857-4685-be1f-d57550cc96cc" xsi:nil="true"/>
+    <UACurrentWords xmlns="4873beb7-5857-4685-be1f-d57550cc96cc" xsi:nil="true"/>
+    <ArtSampleDocs xmlns="4873beb7-5857-4685-be1f-d57550cc96cc" xsi:nil="true"/>
+    <UALocRecommendation xmlns="4873beb7-5857-4685-be1f-d57550cc96cc">Localize</UALocRecommendation>
+    <Manager xmlns="4873beb7-5857-4685-be1f-d57550cc96cc" xsi:nil="true"/>
+    <ShowIn xmlns="4873beb7-5857-4685-be1f-d57550cc96cc">Show everywhere</ShowIn>
+    <UANotes xmlns="4873beb7-5857-4685-be1f-d57550cc96cc" xsi:nil="true"/>
+    <TemplateStatus xmlns="4873beb7-5857-4685-be1f-d57550cc96cc">Complete</TemplateStatus>
+    <InternalTagsTaxHTField0 xmlns="4873beb7-5857-4685-be1f-d57550cc96cc">
+      <Terms xmlns="http://schemas.microsoft.com/office/infopath/2007/PartnerControls"/>
+    </InternalTagsTaxHTField0>
+    <CSXHash xmlns="4873beb7-5857-4685-be1f-d57550cc96cc" xsi:nil="true"/>
+    <Downloads xmlns="4873beb7-5857-4685-be1f-d57550cc96cc">0</Downloads>
+    <VoteCount xmlns="4873beb7-5857-4685-be1f-d57550cc96cc" xsi:nil="true"/>
+    <OOCacheId xmlns="4873beb7-5857-4685-be1f-d57550cc96cc" xsi:nil="true"/>
+    <IsDeleted xmlns="4873beb7-5857-4685-be1f-d57550cc96cc">false</IsDeleted>
+    <AssetExpire xmlns="4873beb7-5857-4685-be1f-d57550cc96cc">2029-01-01T08:00:00+00:00</AssetExpire>
+    <DSATActionTaken xmlns="4873beb7-5857-4685-be1f-d57550cc96cc" xsi:nil="true"/>
+    <CSXSubmissionMarket xmlns="4873beb7-5857-4685-be1f-d57550cc96cc" xsi:nil="true"/>
+    <TPExecutable xmlns="4873beb7-5857-4685-be1f-d57550cc96cc" xsi:nil="true"/>
+    <SubmitterId xmlns="4873beb7-5857-4685-be1f-d57550cc96cc" xsi:nil="true"/>
+    <EditorialTags xmlns="4873beb7-5857-4685-be1f-d57550cc96cc" xsi:nil="true"/>
+    <ApprovalLog xmlns="4873beb7-5857-4685-be1f-d57550cc96cc" xsi:nil="true"/>
+    <AssetType xmlns="4873beb7-5857-4685-be1f-d57550cc96cc">TP</AssetType>
+    <BugNumber xmlns="4873beb7-5857-4685-be1f-d57550cc96cc" xsi:nil="true"/>
+    <CSXSubmissionDate xmlns="4873beb7-5857-4685-be1f-d57550cc96cc" xsi:nil="true"/>
+    <CSXUpdate xmlns="4873beb7-5857-4685-be1f-d57550cc96cc">false</CSXUpdate>
+    <Milestone xmlns="4873beb7-5857-4685-be1f-d57550cc96cc" xsi:nil="true"/>
+    <RecommendationsModifier xmlns="4873beb7-5857-4685-be1f-d57550cc96cc" xsi:nil="true"/>
+    <OriginAsset xmlns="4873beb7-5857-4685-be1f-d57550cc96cc" xsi:nil="true"/>
+    <TPComponent xmlns="4873beb7-5857-4685-be1f-d57550cc96cc" xsi:nil="true"/>
+    <AssetId xmlns="4873beb7-5857-4685-be1f-d57550cc96cc">TP102923943</AssetId>
+    <IntlLocPriority xmlns="4873beb7-5857-4685-be1f-d57550cc96cc" xsi:nil="true"/>
+    <PolicheckWords xmlns="4873beb7-5857-4685-be1f-d57550cc96cc" xsi:nil="true"/>
+    <TPLaunchHelpLink xmlns="4873beb7-5857-4685-be1f-d57550cc96cc" xsi:nil="true"/>
+    <TPApplication xmlns="4873beb7-5857-4685-be1f-d57550cc96cc" xsi:nil="true"/>
+    <CrawlForDependencies xmlns="4873beb7-5857-4685-be1f-d57550cc96cc">false</CrawlForDependencies>
+    <HandoffToMSDN xmlns="4873beb7-5857-4685-be1f-d57550cc96cc" xsi:nil="true"/>
+    <PlannedPubDate xmlns="4873beb7-5857-4685-be1f-d57550cc96cc" xsi:nil="true"/>
+    <IntlLangReviewer xmlns="4873beb7-5857-4685-be1f-d57550cc96cc" xsi:nil="true"/>
+    <TrustLevel xmlns="4873beb7-5857-4685-be1f-d57550cc96cc">1 Microsoft Managed Content</TrustLevel>
+    <LocLastLocAttemptVersionLookup xmlns="4873beb7-5857-4685-be1f-d57550cc96cc">843282</LocLastLocAttemptVersionLookup>
+    <IsSearchable xmlns="4873beb7-5857-4685-be1f-d57550cc96cc">true</IsSearchable>
+    <TemplateTemplateType xmlns="4873beb7-5857-4685-be1f-d57550cc96cc">PowerPoint Template - Slideshow Launch</TemplateTemplateType>
+    <CampaignTagsTaxHTField0 xmlns="4873beb7-5857-4685-be1f-d57550cc96cc">
+      <Terms xmlns="http://schemas.microsoft.com/office/infopath/2007/PartnerControls"/>
+    </CampaignTagsTaxHTField0>
+    <TPNamespace xmlns="4873beb7-5857-4685-be1f-d57550cc96cc" xsi:nil="true"/>
+    <TaxCatchAll xmlns="4873beb7-5857-4685-be1f-d57550cc96cc"/>
+    <Markets xmlns="4873beb7-5857-4685-be1f-d57550cc96cc"/>
+    <UAProjectedTotalWords xmlns="4873beb7-5857-4685-be1f-d57550cc96cc" xsi:nil="true"/>
+    <IntlLangReview xmlns="4873beb7-5857-4685-be1f-d57550cc96cc">false</IntlLangReview>
+    <OutputCachingOn xmlns="4873beb7-5857-4685-be1f-d57550cc96cc">false</OutputCachingOn>
+    <AverageRating xmlns="4873beb7-5857-4685-be1f-d57550cc96cc" xsi:nil="true"/>
+    <LocMarketGroupTiers2 xmlns="4873beb7-5857-4685-be1f-d57550cc96cc" xsi:nil="true"/>
+    <APAuthor xmlns="4873beb7-5857-4685-be1f-d57550cc96cc">
+      <UserInfo>
+        <DisplayName>REDMOND\v-sa</DisplayName>
+        <AccountId>2467</AccountId>
+        <AccountType/>
+      </UserInfo>
+    </APAuthor>
+    <LocManualTestRequired xmlns="4873beb7-5857-4685-be1f-d57550cc96cc">false</LocManualTestRequired>
+    <TPCommandLine xmlns="4873beb7-5857-4685-be1f-d57550cc96cc" xsi:nil="true"/>
+    <TPAppVersion xmlns="4873beb7-5857-4685-be1f-d57550cc96cc" xsi:nil="true"/>
+    <EditorialStatus xmlns="4873beb7-5857-4685-be1f-d57550cc96cc">Complete</EditorialStatus>
+    <LastModifiedDateTime xmlns="4873beb7-5857-4685-be1f-d57550cc96cc" xsi:nil="true"/>
+    <ScenarioTagsTaxHTField0 xmlns="4873beb7-5857-4685-be1f-d57550cc96cc">
+      <Terms xmlns="http://schemas.microsoft.com/office/infopath/2007/PartnerControls"/>
+    </ScenarioTagsTaxHTField0>
+    <OriginalRelease xmlns="4873beb7-5857-4685-be1f-d57550cc96cc">15</OriginalRelease>
+    <TPLaunchHelpLinkType xmlns="4873beb7-5857-4685-be1f-d57550cc96cc">Template</TPLaunchHelpLinkType>
+    <LocalizationTagsTaxHTField0 xmlns="4873beb7-5857-4685-be1f-d57550cc96cc">
+      <Terms xmlns="http://schemas.microsoft.com/office/infopath/2007/PartnerControls"/>
+    </LocalizationTagsTaxHTField0>
+  </documentManagement>
+</p:properties>
 </file>
 
 <file path=customXml/itemProps1.xml><?xml version="1.0" encoding="utf-8"?>
-<ds:datastoreItem xmlns:ds="http://schemas.openxmlformats.org/officeDocument/2006/customXml" ds:itemID="{B970C04F-E7AC-41AB-9C6D-1B1BB88BFF7F}">
+<ds:datastoreItem xmlns:ds="http://schemas.openxmlformats.org/officeDocument/2006/customXml" ds:itemID="{C3DEC53A-9DF1-4780-BE92-17E971B7A9ED}">
   <ds:schemaRefs>
-    <ds:schemaRef ds:uri="http://schemas.microsoft.com/office/2006/metadata/properties"/>
-    <ds:schemaRef ds:uri="http://schemas.microsoft.com/office/infopath/2007/PartnerControls"/>
-    <ds:schemaRef ds:uri="4873beb7-5857-4685-be1f-d57550cc96cc"/>
+    <ds:schemaRef ds:uri="http://schemas.microsoft.com/sharepoint/v3/contenttype/forms"/>
   </ds:schemaRefs>
 </ds:datastoreItem>
 </file>
@@ -8430,9 +8563,11 @@
 </file>
 
 <file path=customXml/itemProps3.xml><?xml version="1.0" encoding="utf-8"?>
-<ds:datastoreItem xmlns:ds="http://schemas.openxmlformats.org/officeDocument/2006/customXml" ds:itemID="{C3DEC53A-9DF1-4780-BE92-17E971B7A9ED}">
+<ds:datastoreItem xmlns:ds="http://schemas.openxmlformats.org/officeDocument/2006/customXml" ds:itemID="{B970C04F-E7AC-41AB-9C6D-1B1BB88BFF7F}">
   <ds:schemaRefs>
-    <ds:schemaRef ds:uri="http://schemas.microsoft.com/sharepoint/v3/contenttype/forms"/>
+    <ds:schemaRef ds:uri="http://schemas.microsoft.com/office/2006/metadata/properties"/>
+    <ds:schemaRef ds:uri="http://schemas.microsoft.com/office/infopath/2007/PartnerControls"/>
+    <ds:schemaRef ds:uri="4873beb7-5857-4685-be1f-d57550cc96cc"/>
   </ds:schemaRefs>
 </ds:datastoreItem>
 </file>
</xml_diff>